<commit_message>
09.13 Két tanórai munka
</commit_message>
<xml_diff>
--- a/Python, Javascript.pptx
+++ b/Python, Javascript.pptx
@@ -8,7 +8,8 @@
     <p:sldId id="256" r:id="rId2"/>
     <p:sldId id="257" r:id="rId3"/>
     <p:sldId id="259" r:id="rId4"/>
-    <p:sldId id="258" r:id="rId5"/>
+    <p:sldId id="260" r:id="rId5"/>
+    <p:sldId id="258" r:id="rId6"/>
   </p:sldIdLst>
   <p:sldSz cx="12192000" cy="6858000"/>
   <p:notesSz cx="6858000" cy="9144000"/>
@@ -107,7 +108,47 @@
       </a:defRPr>
     </a:lvl9pPr>
   </p:defaultTextStyle>
+  <p:extLst>
+    <p:ext uri="{EFAFB233-063F-42B5-8137-9DF3F51BA10A}">
+      <p15:sldGuideLst xmlns:p15="http://schemas.microsoft.com/office/powerpoint/2012/main"/>
+    </p:ext>
+  </p:extLst>
 </p:presentation>
+</file>
+
+<file path=ppt/commentAuthors.xml><?xml version="1.0" encoding="utf-8"?>
+<p:cmAuthorLst xmlns:a="http://schemas.openxmlformats.org/drawingml/2006/main" xmlns:r="http://schemas.openxmlformats.org/officeDocument/2006/relationships" xmlns:p="http://schemas.openxmlformats.org/presentationml/2006/main">
+  <p:cmAuthor id="1" name="Kerekes István" initials="KI" lastIdx="2" clrIdx="0">
+    <p:extLst>
+      <p:ext uri="{19B8F6BF-5375-455C-9EA6-DF929625EA0E}">
+        <p15:presenceInfo xmlns:p15="http://schemas.microsoft.com/office/powerpoint/2012/main" userId="Kerekes István" providerId="None"/>
+      </p:ext>
+    </p:extLst>
+  </p:cmAuthor>
+</p:cmAuthorLst>
+</file>
+
+<file path=ppt/comments/comment1.xml><?xml version="1.0" encoding="utf-8"?>
+<p:cmLst xmlns:a="http://schemas.openxmlformats.org/drawingml/2006/main" xmlns:r="http://schemas.openxmlformats.org/officeDocument/2006/relationships" xmlns:p="http://schemas.openxmlformats.org/presentationml/2006/main">
+  <p:cm authorId="1" dt="2022-09-13T08:58:10.961" idx="1">
+    <p:pos x="1055" y="2055"/>
+    <p:text>a népszerűség nem tűnik hasznos összehasonlítási alapnak, de nagyban befolyásolja mennyi és milyen minőségű tartalom érhető el az adott nyelvhez.</p:text>
+    <p:extLst>
+      <p:ext uri="{C676402C-5697-4E1C-873F-D02D1690AC5C}">
+        <p15:threadingInfo xmlns:p15="http://schemas.microsoft.com/office/powerpoint/2012/main" timeZoneBias="-120"/>
+      </p:ext>
+    </p:extLst>
+  </p:cm>
+  <p:cm authorId="1" dt="2022-09-13T09:14:56.525" idx="2">
+    <p:pos x="3626" y="2595"/>
+    <p:text/>
+    <p:extLst>
+      <p:ext uri="{C676402C-5697-4E1C-873F-D02D1690AC5C}">
+        <p15:threadingInfo xmlns:p15="http://schemas.microsoft.com/office/powerpoint/2012/main" timeZoneBias="-120"/>
+      </p:ext>
+    </p:extLst>
+  </p:cm>
+</p:cmLst>
 </file>
 
 <file path=ppt/slideLayouts/slideLayout1.xml><?xml version="1.0" encoding="utf-8"?>
@@ -296,7 +337,7 @@
           <a:p>
             <a:fld id="{4AAD347D-5ACD-4C99-B74B-A9C85AD731AF}" type="datetimeFigureOut">
               <a:rPr lang="en-US" dirty="0"/>
-              <a:t>9/9/2022</a:t>
+              <a:t>9/13/2022</a:t>
             </a:fld>
             <a:endParaRPr lang="en-US" dirty="0"/>
           </a:p>
@@ -566,7 +607,7 @@
           <a:p>
             <a:fld id="{4509A250-FF31-4206-8172-F9D3106AACB1}" type="datetimeFigureOut">
               <a:rPr lang="en-US" dirty="0"/>
-              <a:t>9/9/2022</a:t>
+              <a:t>9/13/2022</a:t>
             </a:fld>
             <a:endParaRPr lang="en-US" dirty="0"/>
           </a:p>
@@ -755,7 +796,7 @@
           <a:p>
             <a:fld id="{4509A250-FF31-4206-8172-F9D3106AACB1}" type="datetimeFigureOut">
               <a:rPr lang="en-US" dirty="0"/>
-              <a:t>9/9/2022</a:t>
+              <a:t>9/13/2022</a:t>
             </a:fld>
             <a:endParaRPr lang="en-US" dirty="0"/>
           </a:p>
@@ -1021,7 +1062,7 @@
           <a:p>
             <a:fld id="{4509A250-FF31-4206-8172-F9D3106AACB1}" type="datetimeFigureOut">
               <a:rPr lang="en-US" dirty="0"/>
-              <a:t>9/9/2022</a:t>
+              <a:t>9/13/2022</a:t>
             </a:fld>
             <a:endParaRPr lang="en-US" dirty="0"/>
           </a:p>
@@ -1343,7 +1384,7 @@
           <a:p>
             <a:fld id="{4509A250-FF31-4206-8172-F9D3106AACB1}" type="datetimeFigureOut">
               <a:rPr lang="en-US" dirty="0"/>
-              <a:t>9/9/2022</a:t>
+              <a:t>9/13/2022</a:t>
             </a:fld>
             <a:endParaRPr lang="en-US" dirty="0"/>
           </a:p>
@@ -1957,7 +1998,7 @@
           <a:p>
             <a:fld id="{4509A250-FF31-4206-8172-F9D3106AACB1}" type="datetimeFigureOut">
               <a:rPr lang="en-US" dirty="0"/>
-              <a:t>9/9/2022</a:t>
+              <a:t>9/13/2022</a:t>
             </a:fld>
             <a:endParaRPr lang="en-US" dirty="0"/>
           </a:p>
@@ -2799,7 +2840,7 @@
           <a:p>
             <a:fld id="{4509A250-FF31-4206-8172-F9D3106AACB1}" type="datetimeFigureOut">
               <a:rPr lang="en-US" dirty="0"/>
-              <a:t>9/9/2022</a:t>
+              <a:t>9/13/2022</a:t>
             </a:fld>
             <a:endParaRPr lang="en-US" dirty="0"/>
           </a:p>
@@ -2964,7 +3005,7 @@
           <a:p>
             <a:fld id="{4509A250-FF31-4206-8172-F9D3106AACB1}" type="datetimeFigureOut">
               <a:rPr lang="en-US" dirty="0"/>
-              <a:t>9/9/2022</a:t>
+              <a:t>9/13/2022</a:t>
             </a:fld>
             <a:endParaRPr lang="en-US" dirty="0"/>
           </a:p>
@@ -3139,7 +3180,7 @@
           <a:p>
             <a:fld id="{4509A250-FF31-4206-8172-F9D3106AACB1}" type="datetimeFigureOut">
               <a:rPr lang="en-US" dirty="0"/>
-              <a:t>9/9/2022</a:t>
+              <a:t>9/13/2022</a:t>
             </a:fld>
             <a:endParaRPr lang="en-US" dirty="0"/>
           </a:p>
@@ -3304,7 +3345,7 @@
           <a:p>
             <a:fld id="{9796027F-7875-4030-9381-8BD8C4F21935}" type="datetimeFigureOut">
               <a:rPr lang="en-US" dirty="0"/>
-              <a:t>9/9/2022</a:t>
+              <a:t>9/13/2022</a:t>
             </a:fld>
             <a:endParaRPr lang="en-US" dirty="0"/>
           </a:p>
@@ -3546,7 +3587,7 @@
           <a:p>
             <a:fld id="{9796027F-7875-4030-9381-8BD8C4F21935}" type="datetimeFigureOut">
               <a:rPr lang="en-US" dirty="0"/>
-              <a:t>9/9/2022</a:t>
+              <a:t>9/13/2022</a:t>
             </a:fld>
             <a:endParaRPr lang="en-US" dirty="0"/>
           </a:p>
@@ -3833,7 +3874,7 @@
           <a:p>
             <a:fld id="{9796027F-7875-4030-9381-8BD8C4F21935}" type="datetimeFigureOut">
               <a:rPr lang="en-US" dirty="0"/>
-              <a:t>9/9/2022</a:t>
+              <a:t>9/13/2022</a:t>
             </a:fld>
             <a:endParaRPr lang="en-US" dirty="0"/>
           </a:p>
@@ -4272,7 +4313,7 @@
           <a:p>
             <a:fld id="{9796027F-7875-4030-9381-8BD8C4F21935}" type="datetimeFigureOut">
               <a:rPr lang="en-US" dirty="0"/>
-              <a:t>9/9/2022</a:t>
+              <a:t>9/13/2022</a:t>
             </a:fld>
             <a:endParaRPr lang="en-US" dirty="0"/>
           </a:p>
@@ -4385,7 +4426,7 @@
           <a:p>
             <a:fld id="{4509A250-FF31-4206-8172-F9D3106AACB1}" type="datetimeFigureOut">
               <a:rPr lang="en-US" dirty="0"/>
-              <a:t>9/9/2022</a:t>
+              <a:t>9/13/2022</a:t>
             </a:fld>
             <a:endParaRPr lang="en-US" dirty="0"/>
           </a:p>
@@ -4475,7 +4516,7 @@
           <a:p>
             <a:fld id="{4509A250-FF31-4206-8172-F9D3106AACB1}" type="datetimeFigureOut">
               <a:rPr lang="en-US" dirty="0"/>
-              <a:t>9/9/2022</a:t>
+              <a:t>9/13/2022</a:t>
             </a:fld>
             <a:endParaRPr lang="en-US" dirty="0"/>
           </a:p>
@@ -4749,7 +4790,7 @@
           <a:p>
             <a:fld id="{4509A250-FF31-4206-8172-F9D3106AACB1}" type="datetimeFigureOut">
               <a:rPr lang="en-US" dirty="0"/>
-              <a:t>9/9/2022</a:t>
+              <a:t>9/13/2022</a:t>
             </a:fld>
             <a:endParaRPr lang="en-US" dirty="0"/>
           </a:p>
@@ -5019,7 +5060,7 @@
           <a:p>
             <a:fld id="{4509A250-FF31-4206-8172-F9D3106AACB1}" type="datetimeFigureOut">
               <a:rPr lang="en-US" dirty="0"/>
-              <a:t>9/9/2022</a:t>
+              <a:t>9/13/2022</a:t>
             </a:fld>
             <a:endParaRPr lang="en-US" dirty="0"/>
           </a:p>
@@ -5437,7 +5478,7 @@
           <a:p>
             <a:fld id="{4AAD347D-5ACD-4C99-B74B-A9C85AD731AF}" type="datetimeFigureOut">
               <a:rPr lang="en-US" dirty="0"/>
-              <a:t>9/9/2022</a:t>
+              <a:t>9/13/2022</a:t>
             </a:fld>
             <a:endParaRPr lang="en-US" dirty="0"/>
           </a:p>
@@ -6306,10 +6347,78 @@
           <a:p>
             <a:r>
               <a:rPr lang="hu-HU" dirty="0" smtClean="0"/>
-              <a:t>Könnyen olvasható</a:t>
-            </a:r>
-          </a:p>
-          <a:p>
+              <a:t>Könnyen </a:t>
+            </a:r>
+            <a:r>
+              <a:rPr lang="hu-HU" dirty="0" smtClean="0"/>
+              <a:t>olvasható</a:t>
+            </a:r>
+          </a:p>
+          <a:p>
+            <a:r>
+              <a:rPr lang="hu-HU" dirty="0" smtClean="0"/>
+              <a:t>Egyszerűbb, mint a C/C++ vagy a JAVA</a:t>
+            </a:r>
+            <a:endParaRPr lang="hu-HU" dirty="0" smtClean="0"/>
+          </a:p>
+          <a:p>
+            <a:r>
+              <a:rPr lang="hu-HU" dirty="0" smtClean="0"/>
+              <a:t>Objektum Orientált</a:t>
+            </a:r>
+          </a:p>
+          <a:p>
+            <a:r>
+              <a:rPr lang="hu-HU" dirty="0" smtClean="0"/>
+              <a:t>Népszerű – lehagyta a többi nyelvet a </a:t>
+            </a:r>
+            <a:r>
+              <a:rPr lang="hu-HU" dirty="0" err="1" smtClean="0"/>
+              <a:t>stackoverflow-on</a:t>
+            </a:r>
+            <a:r>
+              <a:rPr lang="hu-HU" dirty="0" smtClean="0"/>
+              <a:t> </a:t>
+            </a:r>
+          </a:p>
+          <a:p>
+            <a:r>
+              <a:rPr lang="hu-HU" dirty="0" smtClean="0"/>
+              <a:t>A nagyobb cégek használják(pl. Google, Facebook, </a:t>
+            </a:r>
+            <a:r>
+              <a:rPr lang="hu-HU" dirty="0" err="1" smtClean="0"/>
+              <a:t>Uber</a:t>
+            </a:r>
+            <a:r>
+              <a:rPr lang="hu-HU" dirty="0" smtClean="0"/>
+              <a:t>, </a:t>
+            </a:r>
+            <a:r>
+              <a:rPr lang="hu-HU" dirty="0" err="1" smtClean="0"/>
+              <a:t>Nasa</a:t>
+            </a:r>
+            <a:r>
+              <a:rPr lang="hu-HU" dirty="0" smtClean="0"/>
+              <a:t>) </a:t>
+            </a:r>
+          </a:p>
+          <a:p>
+            <a:r>
+              <a:rPr lang="hu-HU" dirty="0" smtClean="0"/>
+              <a:t>Ingyenes az összes könyvtárával együtt – Open </a:t>
+            </a:r>
+            <a:r>
+              <a:rPr lang="hu-HU" dirty="0" err="1" smtClean="0"/>
+              <a:t>Source</a:t>
+            </a:r>
+            <a:endParaRPr lang="hu-HU" dirty="0" smtClean="0"/>
+          </a:p>
+          <a:p>
+            <a:r>
+              <a:rPr lang="hu-HU" dirty="0" smtClean="0"/>
+              <a:t>Gépi tanuláshoz elengedhetetlen</a:t>
+            </a:r>
             <a:endParaRPr lang="hu-HU" dirty="0" smtClean="0"/>
           </a:p>
           <a:p>
@@ -6364,6 +6473,108 @@
           <a:p>
             <a:r>
               <a:rPr lang="hu-HU" dirty="0" smtClean="0"/>
+              <a:t>Hátrányai: </a:t>
+            </a:r>
+            <a:endParaRPr lang="hu-HU" dirty="0"/>
+          </a:p>
+        </p:txBody>
+      </p:sp>
+      <p:sp>
+        <p:nvSpPr>
+          <p:cNvPr id="3" name="Tartalom helye 2"/>
+          <p:cNvSpPr>
+            <a:spLocks noGrp="1"/>
+          </p:cNvSpPr>
+          <p:nvPr>
+            <p:ph idx="1"/>
+          </p:nvPr>
+        </p:nvSpPr>
+        <p:spPr/>
+        <p:txBody>
+          <a:bodyPr/>
+          <a:lstStyle/>
+          <a:p>
+            <a:r>
+              <a:rPr lang="hu-HU" dirty="0" smtClean="0"/>
+              <a:t>Korlátozott a sebessége</a:t>
+            </a:r>
+          </a:p>
+          <a:p>
+            <a:r>
+              <a:rPr lang="hu-HU" dirty="0" smtClean="0"/>
+              <a:t>Hatalmas mennyiségű memóriát használ.</a:t>
+            </a:r>
+          </a:p>
+          <a:p>
+            <a:r>
+              <a:rPr lang="hu-HU" dirty="0"/>
+              <a:t>N</a:t>
+            </a:r>
+            <a:r>
+              <a:rPr lang="hu-HU" dirty="0" smtClean="0"/>
+              <a:t>em megfelelő interaktivitás </a:t>
+            </a:r>
+            <a:r>
+              <a:rPr lang="hu-HU" dirty="0"/>
+              <a:t>az adatbázissal</a:t>
+            </a:r>
+            <a:r>
+              <a:rPr lang="hu-HU" dirty="0" smtClean="0"/>
+              <a:t>.</a:t>
+            </a:r>
+          </a:p>
+          <a:p>
+            <a:endParaRPr lang="hu-HU" dirty="0"/>
+          </a:p>
+        </p:txBody>
+      </p:sp>
+    </p:spTree>
+    <p:extLst>
+      <p:ext uri="{BB962C8B-B14F-4D97-AF65-F5344CB8AC3E}">
+        <p14:creationId xmlns:p14="http://schemas.microsoft.com/office/powerpoint/2010/main" val="2571161646"/>
+      </p:ext>
+    </p:extLst>
+  </p:cSld>
+  <p:clrMapOvr>
+    <a:masterClrMapping/>
+  </p:clrMapOvr>
+</p:sld>
+</file>
+
+<file path=ppt/slides/slide5.xml><?xml version="1.0" encoding="utf-8"?>
+<p:sld xmlns:a="http://schemas.openxmlformats.org/drawingml/2006/main" xmlns:r="http://schemas.openxmlformats.org/officeDocument/2006/relationships" xmlns:p="http://schemas.openxmlformats.org/presentationml/2006/main">
+  <p:cSld>
+    <p:spTree>
+      <p:nvGrpSpPr>
+        <p:cNvPr id="1" name=""/>
+        <p:cNvGrpSpPr/>
+        <p:nvPr/>
+      </p:nvGrpSpPr>
+      <p:grpSpPr>
+        <a:xfrm>
+          <a:off x="0" y="0"/>
+          <a:ext cx="0" cy="0"/>
+          <a:chOff x="0" y="0"/>
+          <a:chExt cx="0" cy="0"/>
+        </a:xfrm>
+      </p:grpSpPr>
+      <p:sp>
+        <p:nvSpPr>
+          <p:cNvPr id="2" name="Cím 1"/>
+          <p:cNvSpPr>
+            <a:spLocks noGrp="1"/>
+          </p:cNvSpPr>
+          <p:nvPr>
+            <p:ph type="title"/>
+          </p:nvPr>
+        </p:nvSpPr>
+        <p:spPr/>
+        <p:txBody>
+          <a:bodyPr/>
+          <a:lstStyle/>
+          <a:p>
+            <a:r>
+              <a:rPr lang="hu-HU" dirty="0" smtClean="0"/>
               <a:t>Források:</a:t>
             </a:r>
             <a:endParaRPr lang="hu-HU" dirty="0"/>
@@ -6434,21 +6645,48 @@
               <a:rPr lang="hu-HU" dirty="0">
                 <a:hlinkClick r:id="rId5"/>
               </a:rPr>
-              <a:t>https://</a:t>
-            </a:r>
-            <a:r>
-              <a:rPr lang="hu-HU">
-                <a:hlinkClick r:id="rId5"/>
-              </a:rPr>
-              <a:t>www.python.org</a:t>
-            </a:r>
-            <a:r>
-              <a:rPr lang="hu-HU" smtClean="0">
+              <a:t>https://www.python.org</a:t>
+            </a:r>
+            <a:r>
+              <a:rPr lang="hu-HU" dirty="0" smtClean="0">
                 <a:hlinkClick r:id="rId5"/>
               </a:rPr>
               <a:t>/</a:t>
             </a:r>
-            <a:endParaRPr lang="hu-HU" smtClean="0"/>
+            <a:endParaRPr lang="hu-HU" dirty="0" smtClean="0"/>
+          </a:p>
+          <a:p>
+            <a:r>
+              <a:rPr lang="hu-HU" dirty="0">
+                <a:hlinkClick r:id="rId6"/>
+              </a:rPr>
+              <a:t>https://mesterin.hu/6-ok-amiert-a-python-a-jovo-programozasi-nyelve</a:t>
+            </a:r>
+            <a:r>
+              <a:rPr lang="hu-HU" dirty="0" smtClean="0">
+                <a:hlinkClick r:id="rId6"/>
+              </a:rPr>
+              <a:t>/</a:t>
+            </a:r>
+            <a:endParaRPr lang="hu-HU" dirty="0" smtClean="0"/>
+          </a:p>
+          <a:p>
+            <a:r>
+              <a:rPr lang="hu-HU" dirty="0">
+                <a:hlinkClick r:id="rId7"/>
+              </a:rPr>
+              <a:t>https://</a:t>
+            </a:r>
+            <a:r>
+              <a:rPr lang="hu-HU" dirty="0" smtClean="0">
+                <a:hlinkClick r:id="rId7"/>
+              </a:rPr>
+              <a:t>laptop28.com/hu/a-python-elonyei-es-hatranyai-reszletes-leiras</a:t>
+            </a:r>
+            <a:endParaRPr lang="hu-HU" dirty="0" smtClean="0"/>
+          </a:p>
+          <a:p>
+            <a:endParaRPr lang="hu-HU" dirty="0" smtClean="0"/>
           </a:p>
           <a:p>
             <a:endParaRPr lang="hu-HU" dirty="0" smtClean="0"/>

</xml_diff>